<commit_message>
split title with subtitle
</commit_message>
<xml_diff>
--- a/slides.pptx
+++ b/slides.pptx
@@ -3126,7 +3126,7 @@
             </a:pPr>
             <a:r>
               <a:rPr/>
-              <a:t>Mobilizing Bat1K through versioned, machine readable and automatically generated data publications.</a:t>
+              <a:t>Mobilizing Bat1K</a:t>
             </a:r>
           </a:p>
         </p:txBody>
@@ -3154,6 +3154,10 @@
             <a:pPr lvl="0" indent="0" marL="0">
               <a:buNone/>
             </a:pPr>
+            <a:r>
+              <a:rPr/>
+              <a:t>through versioned, machine readable and automatically generated data publications.</a:t>
+            </a:r>
             <a:br/>
             <a:br/>
             <a:r>
@@ -3781,7 +3785,7 @@
             </a:pPr>
             <a:r>
               <a:rPr/>
-              <a:t>At NASBR 2025</a:t>
+              <a:t>At NASBR 2024</a:t>
             </a:r>
           </a:p>
         </p:txBody>

</xml_diff>

<commit_message>
more minor edits in examples and captions
</commit_message>
<xml_diff>
--- a/slides.pptx
+++ b/slides.pptx
@@ -16,7 +16,6 @@
     <p:sldId id="264" r:id="rId10"/>
     <p:sldId id="265" r:id="rId11"/>
     <p:sldId id="266" r:id="rId12"/>
-    <p:sldId id="267" r:id="rId13"/>
   </p:sldIdLst>
   <p:sldSz cx="9144000" cy="5143500" type="screen16x9"/>
   <p:notesSz cx="6858000" cy="9144000"/>
@@ -3224,96 +3223,6 @@
             <p:ph type="title"/>
           </p:nvPr>
         </p:nvSpPr>
-        <p:spPr/>
-        <p:txBody>
-          <a:bodyPr/>
-          <a:lstStyle/>
-          <a:p>
-            <a:pPr lvl="0" indent="0" marL="0">
-              <a:buNone/>
-            </a:pPr>
-            <a:r>
-              <a:rPr/>
-              <a:t>Next Steps</a:t>
-            </a:r>
-          </a:p>
-        </p:txBody>
-      </p:sp>
-      <p:sp>
-        <p:nvSpPr>
-          <p:cNvPr id="3" name="Content Placeholder 2"/>
-          <p:cNvSpPr>
-            <a:spLocks noGrp="1"/>
-          </p:cNvSpPr>
-          <p:nvPr>
-            <p:ph idx="1"/>
-          </p:nvPr>
-        </p:nvSpPr>
-        <p:spPr/>
-        <p:txBody>
-          <a:bodyPr/>
-          <a:lstStyle/>
-          <a:p>
-            <a:pPr lvl="0"/>
-            <a:r>
-              <a:rPr/>
-              <a:t>Versioned Bat1K -&gt; DwC-A - Add meta.xml and eml.xml to describe schema according to Darwin Core Archive to enable:</a:t>
-            </a:r>
-          </a:p>
-          <a:p>
-            <a:pPr lvl="1"/>
-            <a:r>
-              <a:rPr/>
-              <a:t>Indexing by GBIF as bat occurrences through vouchered specimen/genome</a:t>
-            </a:r>
-          </a:p>
-          <a:p>
-            <a:pPr lvl="1"/>
-            <a:r>
-              <a:rPr/>
-              <a:t>Indexing by GloBI as bat&lt;&gt;human interactions evidenced by vouchered specimen/genomes to enable automated data reviews </a:t>
-            </a:r>
-            <a:r>
-              <a:rPr baseline="30000">
-                <a:hlinkClick r:id="rId2" action="ppaction://hlinksldjump"/>
-              </a:rPr>
-              <a:t>4</a:t>
-            </a:r>
-          </a:p>
-        </p:txBody>
-      </p:sp>
-    </p:spTree>
-  </p:cSld>
-</p:sld>
-</file>
-
-<file path=ppt/slides/slide11.xml><?xml version="1.0" encoding="utf-8"?>
-<p:sld xmlns:a="http://schemas.openxmlformats.org/drawingml/2006/main" xmlns:r="http://schemas.openxmlformats.org/officeDocument/2006/relationships" xmlns:p="http://schemas.openxmlformats.org/presentationml/2006/main">
-  <p:cSld>
-    <p:spTree>
-      <p:nvGrpSpPr>
-        <p:cNvPr id="1" name=""/>
-        <p:cNvGrpSpPr/>
-        <p:nvPr/>
-      </p:nvGrpSpPr>
-      <p:grpSpPr>
-        <a:xfrm>
-          <a:off x="0" y="0"/>
-          <a:ext cx="0" cy="0"/>
-          <a:chOff x="0" y="0"/>
-          <a:chExt cx="0" cy="0"/>
-        </a:xfrm>
-      </p:grpSpPr>
-      <p:sp>
-        <p:nvSpPr>
-          <p:cNvPr id="2" name="Title 1"/>
-          <p:cNvSpPr>
-            <a:spLocks noGrp="1"/>
-          </p:cNvSpPr>
-          <p:nvPr>
-            <p:ph type="title"/>
-          </p:nvPr>
-        </p:nvSpPr>
         <p:spPr>
           <a:xfrm>
             <a:off x="457201" y="204787"/>
@@ -3436,7 +3345,7 @@
 </p:sld>
 </file>
 
-<file path=ppt/slides/slide12.xml><?xml version="1.0" encoding="utf-8"?>
+<file path=ppt/slides/slide11.xml><?xml version="1.0" encoding="utf-8"?>
 <p:sld xmlns:a="http://schemas.openxmlformats.org/drawingml/2006/main" xmlns:r="http://schemas.openxmlformats.org/officeDocument/2006/relationships" xmlns:p="http://schemas.openxmlformats.org/presentationml/2006/main">
   <p:cSld>
     <p:spTree>
@@ -4088,6 +3997,31 @@
       </p:grpSpPr>
       <p:sp>
         <p:nvSpPr>
+          <p:cNvPr id="2" name="Title 1"/>
+          <p:cNvSpPr>
+            <a:spLocks noGrp="1"/>
+          </p:cNvSpPr>
+          <p:nvPr>
+            <p:ph type="title"/>
+          </p:nvPr>
+        </p:nvSpPr>
+        <p:spPr/>
+        <p:txBody>
+          <a:bodyPr/>
+          <a:lstStyle/>
+          <a:p>
+            <a:pPr lvl="0" indent="0" marL="0">
+              <a:buNone/>
+            </a:pPr>
+            <a:r>
+              <a:rPr/>
+              <a:t>Deriving bat1k.tsv</a:t>
+            </a:r>
+          </a:p>
+        </p:txBody>
+      </p:sp>
+      <p:sp>
+        <p:nvSpPr>
           <p:cNvPr id="3" name="Content Placeholder 2"/>
           <p:cNvSpPr>
             <a:spLocks noGrp="1"/>
@@ -4101,12 +4035,21 @@
           <a:bodyPr/>
           <a:lstStyle/>
           <a:p>
-            <a:pPr lvl="0" indent="0" marL="0">
+            <a:pPr lvl="0" indent="0">
               <a:buNone/>
             </a:pPr>
             <a:r>
-              <a:rPr/>
-              <a:t> ]</a:t>
+              <a:rPr>
+                <a:latin typeface="Courier"/>
+              </a:rPr>
+              <a:t>preston cat\
+ --remote https://linker.bio,https://softwareheritage.org\
+ hash://sha256/710cccc378e6d41e7d2e214bcaf08af76886d9df6e389dc0177c1460fb5c3999\
+ | grep hasVersion\
+ | grep tsv\
+ | preston cat\
+ | tail -n+2\
+ | tee bat1k.tsv</a:t>
             </a:r>
           </a:p>
         </p:txBody>
@@ -4153,7 +4096,7 @@
             </a:pPr>
             <a:r>
               <a:rPr/>
-              <a:t>Deriving bat1k.tsv</a:t>
+              <a:t>Taxonomic Alignement through Nomer - Find (mis-)Alignments</a:t>
             </a:r>
           </a:p>
         </p:txBody>
@@ -4172,6 +4115,21 @@
         <p:txBody>
           <a:bodyPr/>
           <a:lstStyle/>
+          <a:p>
+            <a:pPr lvl="0" indent="0" marL="0">
+              <a:buNone/>
+            </a:pPr>
+            <a:r>
+              <a:rPr/>
+              <a:t>Using Nomer </a:t>
+            </a:r>
+            <a:r>
+              <a:rPr baseline="30000">
+                <a:hlinkClick r:id="rId2" action="ppaction://hlinksldjump"/>
+              </a:rPr>
+              <a:t>3</a:t>
+            </a:r>
+          </a:p>
           <a:p>
             <a:pPr lvl="0" indent="0">
               <a:buNone/>
@@ -4180,13 +4138,24 @@
               <a:rPr>
                 <a:latin typeface="Courier"/>
               </a:rPr>
-              <a:t>preston cat\
- hash://sha256/710cccc378e6d41e7d2e214bcaf08af76886d9df6e389dc0177c1460fb5c3999\
- | grep hasVersion\
- | grep tsv\
- | preston cat\
- | tail -n+2\
- | tee bat1k.tsv</a:t>
+              <a:t>cat bat1k.tsv\
+ | nomer append\
+ --properties &lt;(echo 'nomer.schema.input=[{"column":0,"type":"externalId"},{"column": 1,"type":"name"}]') mdd\
+ | grep -v HAS_ACCEPTED_NAME\
+ | cut -f2\
+ | tail -n+2</a:t>
+            </a:r>
+          </a:p>
+          <a:p>
+            <a:pPr lvl="0" indent="0">
+              <a:buNone/>
+            </a:pPr>
+            <a:r>
+              <a:rPr>
+                <a:latin typeface="Courier"/>
+              </a:rPr>
+              <a:t>Lasiurus ega
+Hipposideros swinhoii  </a:t>
             </a:r>
           </a:p>
         </p:txBody>
@@ -4233,7 +4202,7 @@
             </a:pPr>
             <a:r>
               <a:rPr/>
-              <a:t>Taxonomic Alignement through Nomer - Find (mis-)Alignments</a:t>
+              <a:t>Next Steps</a:t>
             </a:r>
           </a:p>
         </p:txBody>
@@ -4253,46 +4222,30 @@
           <a:bodyPr/>
           <a:lstStyle/>
           <a:p>
-            <a:pPr lvl="0" indent="0" marL="0">
-              <a:buNone/>
-            </a:pPr>
+            <a:pPr lvl="0"/>
             <a:r>
               <a:rPr/>
-              <a:t>Using Nomer </a:t>
+              <a:t>Versioned Bat1K -&gt; DwC-A - Add meta.xml and eml.xml to describe schema according to Darwin Core Archive to enable:</a:t>
+            </a:r>
+          </a:p>
+          <a:p>
+            <a:pPr lvl="1"/>
+            <a:r>
+              <a:rPr/>
+              <a:t>Indexing by GBIF as bat occurrences through vouchered specimen/genome</a:t>
+            </a:r>
+          </a:p>
+          <a:p>
+            <a:pPr lvl="1"/>
+            <a:r>
+              <a:rPr/>
+              <a:t>Indexing by GloBI as bat&lt;&gt;human interactions evidenced by vouchered specimen/genomes to enable automated data reviews </a:t>
             </a:r>
             <a:r>
               <a:rPr baseline="30000">
                 <a:hlinkClick r:id="rId2" action="ppaction://hlinksldjump"/>
               </a:rPr>
-              <a:t>3</a:t>
-            </a:r>
-          </a:p>
-          <a:p>
-            <a:pPr lvl="0" indent="0">
-              <a:buNone/>
-            </a:pPr>
-            <a:r>
-              <a:rPr>
-                <a:latin typeface="Courier"/>
-              </a:rPr>
-              <a:t>cat bat1k.tsv\
- | nomer append\
- --properties &lt;(echo 'nomer.schema.input=[{"column":0,"type":"externalId"},{"column": 1,"type":"name"}]') mdd\
- | grep -v HAS_ACCEPTED_NAME\
- | cut -f2\
- | tail -n+2</a:t>
-            </a:r>
-          </a:p>
-          <a:p>
-            <a:pPr lvl="0" indent="0">
-              <a:buNone/>
-            </a:pPr>
-            <a:r>
-              <a:rPr>
-                <a:latin typeface="Courier"/>
-              </a:rPr>
-              <a:t>Lasiurus ega
-Hipposideros swinhoii  </a:t>
+              <a:t>4</a:t>
             </a:r>
           </a:p>
         </p:txBody>

</xml_diff>